<commit_message>
docs(fase1): carga de mockups
</commit_message>
<xml_diff>
--- a/fase1/Documentacion Individual/Estructura Presentación 1-Capstone.pptx
+++ b/fase1/Documentacion Individual/Estructura Presentación 1-Capstone.pptx
@@ -3104,7 +3104,7 @@
           <a:p>
             <a:fld id="{5AAB0916-E07D-42EB-9C54-2314ADA0F462}" type="datetimeFigureOut">
               <a:rPr lang="es-CL" smtClean="0"/>
-              <a:t>28-08-2025</a:t>
+              <a:t>07-09-2025</a:t>
             </a:fld>
             <a:endParaRPr lang="es-CL"/>
           </a:p>
@@ -3587,7 +3587,7 @@
           <a:p>
             <a:fld id="{C56040A3-26B0-41B9-8D0E-A6E2BE76A0F6}" type="datetimeFigureOut">
               <a:rPr lang="es-CL" smtClean="0"/>
-              <a:t>28-08-2025</a:t>
+              <a:t>07-09-2025</a:t>
             </a:fld>
             <a:endParaRPr lang="es-CL"/>
           </a:p>
@@ -3757,7 +3757,7 @@
           <a:p>
             <a:fld id="{C56040A3-26B0-41B9-8D0E-A6E2BE76A0F6}" type="datetimeFigureOut">
               <a:rPr lang="es-CL" smtClean="0"/>
-              <a:t>28-08-2025</a:t>
+              <a:t>07-09-2025</a:t>
             </a:fld>
             <a:endParaRPr lang="es-CL"/>
           </a:p>
@@ -3937,7 +3937,7 @@
           <a:p>
             <a:fld id="{C56040A3-26B0-41B9-8D0E-A6E2BE76A0F6}" type="datetimeFigureOut">
               <a:rPr lang="es-CL" smtClean="0"/>
-              <a:t>28-08-2025</a:t>
+              <a:t>07-09-2025</a:t>
             </a:fld>
             <a:endParaRPr lang="es-CL"/>
           </a:p>
@@ -4107,7 +4107,7 @@
           <a:p>
             <a:fld id="{C56040A3-26B0-41B9-8D0E-A6E2BE76A0F6}" type="datetimeFigureOut">
               <a:rPr lang="es-CL" smtClean="0"/>
-              <a:t>28-08-2025</a:t>
+              <a:t>07-09-2025</a:t>
             </a:fld>
             <a:endParaRPr lang="es-CL"/>
           </a:p>
@@ -4353,7 +4353,7 @@
           <a:p>
             <a:fld id="{C56040A3-26B0-41B9-8D0E-A6E2BE76A0F6}" type="datetimeFigureOut">
               <a:rPr lang="es-CL" smtClean="0"/>
-              <a:t>28-08-2025</a:t>
+              <a:t>07-09-2025</a:t>
             </a:fld>
             <a:endParaRPr lang="es-CL"/>
           </a:p>
@@ -4585,7 +4585,7 @@
           <a:p>
             <a:fld id="{C56040A3-26B0-41B9-8D0E-A6E2BE76A0F6}" type="datetimeFigureOut">
               <a:rPr lang="es-CL" smtClean="0"/>
-              <a:t>28-08-2025</a:t>
+              <a:t>07-09-2025</a:t>
             </a:fld>
             <a:endParaRPr lang="es-CL"/>
           </a:p>
@@ -4952,7 +4952,7 @@
           <a:p>
             <a:fld id="{C56040A3-26B0-41B9-8D0E-A6E2BE76A0F6}" type="datetimeFigureOut">
               <a:rPr lang="es-CL" smtClean="0"/>
-              <a:t>28-08-2025</a:t>
+              <a:t>07-09-2025</a:t>
             </a:fld>
             <a:endParaRPr lang="es-CL"/>
           </a:p>
@@ -5070,7 +5070,7 @@
           <a:p>
             <a:fld id="{C56040A3-26B0-41B9-8D0E-A6E2BE76A0F6}" type="datetimeFigureOut">
               <a:rPr lang="es-CL" smtClean="0"/>
-              <a:t>28-08-2025</a:t>
+              <a:t>07-09-2025</a:t>
             </a:fld>
             <a:endParaRPr lang="es-CL"/>
           </a:p>
@@ -5165,7 +5165,7 @@
           <a:p>
             <a:fld id="{C56040A3-26B0-41B9-8D0E-A6E2BE76A0F6}" type="datetimeFigureOut">
               <a:rPr lang="es-CL" smtClean="0"/>
-              <a:t>28-08-2025</a:t>
+              <a:t>07-09-2025</a:t>
             </a:fld>
             <a:endParaRPr lang="es-CL"/>
           </a:p>
@@ -5442,7 +5442,7 @@
           <a:p>
             <a:fld id="{C56040A3-26B0-41B9-8D0E-A6E2BE76A0F6}" type="datetimeFigureOut">
               <a:rPr lang="es-CL" smtClean="0"/>
-              <a:t>28-08-2025</a:t>
+              <a:t>07-09-2025</a:t>
             </a:fld>
             <a:endParaRPr lang="es-CL"/>
           </a:p>
@@ -5695,7 +5695,7 @@
           <a:p>
             <a:fld id="{C56040A3-26B0-41B9-8D0E-A6E2BE76A0F6}" type="datetimeFigureOut">
               <a:rPr lang="es-CL" smtClean="0"/>
-              <a:t>28-08-2025</a:t>
+              <a:t>07-09-2025</a:t>
             </a:fld>
             <a:endParaRPr lang="es-CL"/>
           </a:p>
@@ -5917,7 +5917,7 @@
           <a:p>
             <a:fld id="{C56040A3-26B0-41B9-8D0E-A6E2BE76A0F6}" type="datetimeFigureOut">
               <a:rPr lang="es-CL" smtClean="0"/>
-              <a:t>28-08-2025</a:t>
+              <a:t>07-09-2025</a:t>
             </a:fld>
             <a:endParaRPr lang="es-CL"/>
           </a:p>
@@ -8756,7 +8756,7 @@
           <p:nvPr>
             <p:extLst>
               <p:ext uri="{D42A27DB-BD31-4B8C-83A1-F6EECF244321}">
-                <p14:modId xmlns:p14="http://schemas.microsoft.com/office/powerpoint/2010/main" val="114275947"/>
+                <p14:modId xmlns:p14="http://schemas.microsoft.com/office/powerpoint/2010/main" val="1150778378"/>
               </p:ext>
             </p:extLst>
           </p:nvPr>

</xml_diff>